<commit_message>
Start at V1.4, fixes & intro ukit
Signed-off-by: Gernot Heiser <gernot@unsw.edu.au>
</commit_message>
<xml_diff>
--- a/imgs/figs.pptx
+++ b/imgs/figs.pptx
@@ -5,7 +5,7 @@
     <p:sldMasterId id="2147483690" r:id="rId1"/>
   </p:sldMasterIdLst>
   <p:notesMasterIdLst>
-    <p:notesMasterId r:id="rId17"/>
+    <p:notesMasterId r:id="rId18"/>
   </p:notesMasterIdLst>
   <p:sldIdLst>
     <p:sldId id="368" r:id="rId2"/>
@@ -14,15 +14,16 @@
     <p:sldId id="380" r:id="rId5"/>
     <p:sldId id="370" r:id="rId6"/>
     <p:sldId id="417" r:id="rId7"/>
-    <p:sldId id="373" r:id="rId8"/>
-    <p:sldId id="381" r:id="rId9"/>
-    <p:sldId id="375" r:id="rId10"/>
-    <p:sldId id="476" r:id="rId11"/>
-    <p:sldId id="477" r:id="rId12"/>
-    <p:sldId id="377" r:id="rId13"/>
-    <p:sldId id="372" r:id="rId14"/>
-    <p:sldId id="268" r:id="rId15"/>
-    <p:sldId id="269" r:id="rId16"/>
+    <p:sldId id="257" r:id="rId8"/>
+    <p:sldId id="373" r:id="rId9"/>
+    <p:sldId id="381" r:id="rId10"/>
+    <p:sldId id="375" r:id="rId11"/>
+    <p:sldId id="476" r:id="rId12"/>
+    <p:sldId id="477" r:id="rId13"/>
+    <p:sldId id="377" r:id="rId14"/>
+    <p:sldId id="372" r:id="rId15"/>
+    <p:sldId id="268" r:id="rId16"/>
+    <p:sldId id="269" r:id="rId17"/>
   </p:sldIdLst>
   <p:sldSz cx="9144000" cy="6858000" type="screen4x3"/>
   <p:notesSz cx="6858000" cy="9144000"/>
@@ -1145,7 +1146,7 @@
           <a:p>
             <a:fld id="{05134E6F-9D5E-524C-9D23-84D0688B83F4}" type="datetimeFigureOut">
               <a:rPr lang="en-US" smtClean="0"/>
-              <a:t>6/10/20</a:t>
+              <a:t>12/30/24</a:t>
             </a:fld>
             <a:endParaRPr lang="en-US"/>
           </a:p>
@@ -1541,7 +1542,10 @@
           <a:bodyPr/>
           <a:lstStyle/>
           <a:p>
-            <a:endParaRPr lang="en-AU" dirty="0"/>
+            <a:r>
+              <a:rPr lang="en-AU" dirty="0"/>
+              <a:t>“Better support than under paid support contracts with commercial OSes.”</a:t>
+            </a:r>
           </a:p>
         </p:txBody>
       </p:sp>
@@ -1560,18 +1564,24 @@
           <a:bodyPr/>
           <a:lstStyle/>
           <a:p>
-            <a:fld id="{ED3FD65A-8DD2-DB44-8733-76CC4AFB250D}" type="slidenum">
-              <a:rPr lang="en-US" smtClean="0"/>
-              <a:t>7</a:t>
+            <a:pPr>
+              <a:defRPr/>
+            </a:pPr>
+            <a:fld id="{FDC12F84-4990-F244-8F8A-1B6D2C440387}" type="slidenum">
+              <a:rPr lang="en-US" altLang="en-US" smtClean="0"/>
+              <a:pPr>
+                <a:defRPr/>
+              </a:pPr>
+              <a:t>6</a:t>
             </a:fld>
-            <a:endParaRPr lang="en-US"/>
+            <a:endParaRPr lang="en-US" altLang="en-US"/>
           </a:p>
         </p:txBody>
       </p:sp>
     </p:spTree>
     <p:extLst>
       <p:ext uri="{BB962C8B-B14F-4D97-AF65-F5344CB8AC3E}">
-        <p14:creationId xmlns:p14="http://schemas.microsoft.com/office/powerpoint/2010/main" val="1316876304"/>
+        <p14:creationId xmlns:p14="http://schemas.microsoft.com/office/powerpoint/2010/main" val="3516771998"/>
       </p:ext>
     </p:extLst>
   </p:cSld>
@@ -1644,6 +1654,90 @@
           <a:bodyPr/>
           <a:lstStyle/>
           <a:p>
+            <a:fld id="{ED3FD65A-8DD2-DB44-8733-76CC4AFB250D}" type="slidenum">
+              <a:rPr lang="en-US" smtClean="0"/>
+              <a:t>8</a:t>
+            </a:fld>
+            <a:endParaRPr lang="en-US"/>
+          </a:p>
+        </p:txBody>
+      </p:sp>
+    </p:spTree>
+    <p:extLst>
+      <p:ext uri="{BB962C8B-B14F-4D97-AF65-F5344CB8AC3E}">
+        <p14:creationId xmlns:p14="http://schemas.microsoft.com/office/powerpoint/2010/main" val="1316876304"/>
+      </p:ext>
+    </p:extLst>
+  </p:cSld>
+  <p:clrMapOvr>
+    <a:masterClrMapping/>
+  </p:clrMapOvr>
+</p:notes>
+</file>
+
+<file path=ppt/notesSlides/notesSlide4.xml><?xml version="1.0" encoding="utf-8"?>
+<p:notes xmlns:a="http://schemas.openxmlformats.org/drawingml/2006/main" xmlns:r="http://schemas.openxmlformats.org/officeDocument/2006/relationships" xmlns:p="http://schemas.openxmlformats.org/presentationml/2006/main">
+  <p:cSld>
+    <p:spTree>
+      <p:nvGrpSpPr>
+        <p:cNvPr id="1" name=""/>
+        <p:cNvGrpSpPr/>
+        <p:nvPr/>
+      </p:nvGrpSpPr>
+      <p:grpSpPr>
+        <a:xfrm>
+          <a:off x="0" y="0"/>
+          <a:ext cx="0" cy="0"/>
+          <a:chOff x="0" y="0"/>
+          <a:chExt cx="0" cy="0"/>
+        </a:xfrm>
+      </p:grpSpPr>
+      <p:sp>
+        <p:nvSpPr>
+          <p:cNvPr id="2" name="Slide Image Placeholder 1"/>
+          <p:cNvSpPr>
+            <a:spLocks noGrp="1" noRot="1" noChangeAspect="1"/>
+          </p:cNvSpPr>
+          <p:nvPr>
+            <p:ph type="sldImg"/>
+          </p:nvPr>
+        </p:nvSpPr>
+        <p:spPr/>
+      </p:sp>
+      <p:sp>
+        <p:nvSpPr>
+          <p:cNvPr id="3" name="Notes Placeholder 2"/>
+          <p:cNvSpPr>
+            <a:spLocks noGrp="1"/>
+          </p:cNvSpPr>
+          <p:nvPr>
+            <p:ph type="body" idx="1"/>
+          </p:nvPr>
+        </p:nvSpPr>
+        <p:spPr/>
+        <p:txBody>
+          <a:bodyPr/>
+          <a:lstStyle/>
+          <a:p>
+            <a:endParaRPr lang="en-AU" dirty="0"/>
+          </a:p>
+        </p:txBody>
+      </p:sp>
+      <p:sp>
+        <p:nvSpPr>
+          <p:cNvPr id="4" name="Slide Number Placeholder 3"/>
+          <p:cNvSpPr>
+            <a:spLocks noGrp="1"/>
+          </p:cNvSpPr>
+          <p:nvPr>
+            <p:ph type="sldNum" sz="quarter" idx="5"/>
+          </p:nvPr>
+        </p:nvSpPr>
+        <p:spPr/>
+        <p:txBody>
+          <a:bodyPr/>
+          <a:lstStyle/>
+          <a:p>
             <a:pPr>
               <a:defRPr/>
             </a:pPr>
@@ -1652,7 +1746,7 @@
               <a:pPr>
                 <a:defRPr/>
               </a:pPr>
-              <a:t>9</a:t>
+              <a:t>10</a:t>
             </a:fld>
             <a:endParaRPr lang="en-US" altLang="en-US"/>
           </a:p>
@@ -2049,7 +2143,7 @@
           <a:p>
             <a:fld id="{47717F0E-9E2D-1B48-8C31-F0E1044BA0EA}" type="datetime1">
               <a:rPr lang="en-AU" smtClean="0"/>
-              <a:t>10/6/20</a:t>
+              <a:t>30/12/2024</a:t>
             </a:fld>
             <a:endParaRPr lang="en-US"/>
           </a:p>
@@ -2270,7 +2364,7 @@
           <a:p>
             <a:fld id="{04739727-8BC3-A44D-9ED9-A2A04540DA59}" type="datetime1">
               <a:rPr lang="en-AU" smtClean="0"/>
-              <a:t>10/6/20</a:t>
+              <a:t>30/12/2024</a:t>
             </a:fld>
             <a:endParaRPr lang="en-US"/>
           </a:p>
@@ -2465,7 +2559,7 @@
           <a:p>
             <a:fld id="{2D01FD94-327D-2243-AF0F-8CA8431D095B}" type="datetime1">
               <a:rPr lang="en-AU" smtClean="0"/>
-              <a:t>10/6/20</a:t>
+              <a:t>30/12/2024</a:t>
             </a:fld>
             <a:endParaRPr lang="en-US"/>
           </a:p>
@@ -2856,7 +2950,7 @@
           <a:p>
             <a:fld id="{9921BE08-BAEA-CC40-BC14-9837D532DED7}" type="datetime1">
               <a:rPr lang="en-AU" smtClean="0"/>
-              <a:t>10/6/20</a:t>
+              <a:t>30/12/2024</a:t>
             </a:fld>
             <a:endParaRPr lang="en-US"/>
           </a:p>
@@ -3160,7 +3254,7 @@
           <a:p>
             <a:fld id="{E441952F-7800-FC42-A2E0-5DACAA055B4B}" type="datetime1">
               <a:rPr lang="en-AU" smtClean="0"/>
-              <a:t>10/6/20</a:t>
+              <a:t>30/12/2024</a:t>
             </a:fld>
             <a:endParaRPr lang="en-US"/>
           </a:p>
@@ -3409,7 +3503,7 @@
           <a:p>
             <a:fld id="{C363C265-1E2C-934E-AA55-74A1817C2219}" type="datetime1">
               <a:rPr lang="en-AU" smtClean="0"/>
-              <a:t>10/6/20</a:t>
+              <a:t>30/12/2024</a:t>
             </a:fld>
             <a:endParaRPr lang="en-US"/>
           </a:p>
@@ -3786,7 +3880,7 @@
           <a:p>
             <a:fld id="{4A219F78-78C2-3642-903F-5B4CB2DA09E2}" type="datetime1">
               <a:rPr lang="en-AU" smtClean="0"/>
-              <a:t>10/6/20</a:t>
+              <a:t>30/12/2024</a:t>
             </a:fld>
             <a:endParaRPr lang="en-US"/>
           </a:p>
@@ -3907,7 +4001,7 @@
           <a:p>
             <a:fld id="{26862002-4AE6-9D4C-81F9-07CEDA7CB80F}" type="datetime1">
               <a:rPr lang="en-AU" smtClean="0"/>
-              <a:t>10/6/20</a:t>
+              <a:t>30/12/2024</a:t>
             </a:fld>
             <a:endParaRPr lang="en-US"/>
           </a:p>
@@ -4035,7 +4129,7 @@
           <a:p>
             <a:fld id="{CA6055E8-984D-F14D-AF76-EE9DB0F046B4}" type="datetime1">
               <a:rPr lang="en-AU" smtClean="0"/>
-              <a:t>10/6/20</a:t>
+              <a:t>30/12/2024</a:t>
             </a:fld>
             <a:endParaRPr lang="en-US"/>
           </a:p>
@@ -4387,7 +4481,7 @@
           <a:p>
             <a:fld id="{5AE48A6D-CE6A-2A4F-856F-6A048877A7F7}" type="datetime1">
               <a:rPr lang="en-AU" smtClean="0"/>
-              <a:t>10/6/20</a:t>
+              <a:t>30/12/2024</a:t>
             </a:fld>
             <a:endParaRPr lang="en-US"/>
           </a:p>
@@ -4763,7 +4857,7 @@
           <a:p>
             <a:fld id="{C6BFF6B6-D494-004B-BDCB-304710DAE166}" type="datetime1">
               <a:rPr lang="en-AU" smtClean="0"/>
-              <a:t>10/6/20</a:t>
+              <a:t>30/12/2024</a:t>
             </a:fld>
             <a:endParaRPr lang="en-US"/>
           </a:p>
@@ -5021,7 +5115,7 @@
           <a:p>
             <a:fld id="{622A4541-1D44-1C4D-9CEE-CDF416EA3019}" type="datetime1">
               <a:rPr lang="en-AU" smtClean="0"/>
-              <a:t>10/6/20</a:t>
+              <a:t>30/12/2024</a:t>
             </a:fld>
             <a:endParaRPr lang="en-US"/>
           </a:p>
@@ -7435,7 +7529,7 @@
                     <a:ea typeface="Roboto" panose="02000000000000000000" pitchFamily="2" charset="0"/>
                     <a:cs typeface="AR PL ShanHeiSun Uni" charset="0"/>
                   </a:rPr>
-                  <a:t>IPC</a:t>
+                  <a:t>PPC</a:t>
                 </a:r>
               </a:p>
             </p:txBody>
@@ -8152,6 +8246,555 @@
       </p:grpSpPr>
       <p:grpSp>
         <p:nvGrpSpPr>
+          <p:cNvPr id="11" name="Group 10">
+            <a:extLst>
+              <a:ext uri="{FF2B5EF4-FFF2-40B4-BE49-F238E27FC236}">
+                <a16:creationId xmlns:a16="http://schemas.microsoft.com/office/drawing/2014/main" id="{D43D4A74-F798-8340-B3DE-C76D52963803}"/>
+              </a:ext>
+            </a:extLst>
+          </p:cNvPr>
+          <p:cNvGrpSpPr/>
+          <p:nvPr/>
+        </p:nvGrpSpPr>
+        <p:grpSpPr>
+          <a:xfrm>
+            <a:off x="1109376" y="2675744"/>
+            <a:ext cx="4279743" cy="1372339"/>
+            <a:chOff x="1109375" y="1818493"/>
+            <a:chExt cx="4279743" cy="1372339"/>
+          </a:xfrm>
+        </p:grpSpPr>
+        <p:pic>
+          <p:nvPicPr>
+            <p:cNvPr id="2" name="Picture 1" descr="key.png">
+              <a:extLst>
+                <a:ext uri="{FF2B5EF4-FFF2-40B4-BE49-F238E27FC236}">
+                  <a16:creationId xmlns:a16="http://schemas.microsoft.com/office/drawing/2014/main" id="{25C1C504-AACD-9147-BC1D-7C6DD1D11B24}"/>
+                </a:ext>
+              </a:extLst>
+            </p:cNvPr>
+            <p:cNvPicPr>
+              <a:picLocks noChangeAspect="1"/>
+            </p:cNvPicPr>
+            <p:nvPr/>
+          </p:nvPicPr>
+          <p:blipFill>
+            <a:blip r:embed="rId2"/>
+            <a:stretch>
+              <a:fillRect/>
+            </a:stretch>
+          </p:blipFill>
+          <p:spPr>
+            <a:xfrm>
+              <a:off x="1187624" y="1922158"/>
+              <a:ext cx="1276828" cy="542652"/>
+            </a:xfrm>
+            <a:prstGeom prst="rect">
+              <a:avLst/>
+            </a:prstGeom>
+          </p:spPr>
+        </p:pic>
+        <p:grpSp>
+          <p:nvGrpSpPr>
+            <p:cNvPr id="3" name="Group 9">
+              <a:extLst>
+                <a:ext uri="{FF2B5EF4-FFF2-40B4-BE49-F238E27FC236}">
+                  <a16:creationId xmlns:a16="http://schemas.microsoft.com/office/drawing/2014/main" id="{654F8256-AC12-6F46-ACBB-8AB5AB54CAFA}"/>
+                </a:ext>
+              </a:extLst>
+            </p:cNvPr>
+            <p:cNvGrpSpPr/>
+            <p:nvPr/>
+          </p:nvGrpSpPr>
+          <p:grpSpPr>
+            <a:xfrm>
+              <a:off x="1109375" y="2513993"/>
+              <a:ext cx="1588854" cy="676839"/>
+              <a:chOff x="2760713" y="3657600"/>
+              <a:chExt cx="1191640" cy="507630"/>
+            </a:xfrm>
+          </p:grpSpPr>
+          <p:sp>
+            <p:nvSpPr>
+              <p:cNvPr id="4" name="TextBox 3">
+                <a:extLst>
+                  <a:ext uri="{FF2B5EF4-FFF2-40B4-BE49-F238E27FC236}">
+                    <a16:creationId xmlns:a16="http://schemas.microsoft.com/office/drawing/2014/main" id="{61843C73-3B87-4E44-B871-7FC92E397726}"/>
+                  </a:ext>
+                </a:extLst>
+              </p:cNvPr>
+              <p:cNvSpPr txBox="1"/>
+              <p:nvPr/>
+            </p:nvSpPr>
+            <p:spPr>
+              <a:xfrm>
+                <a:off x="2760713" y="3657600"/>
+                <a:ext cx="1191639" cy="253916"/>
+              </a:xfrm>
+              <a:prstGeom prst="rect">
+                <a:avLst/>
+              </a:prstGeom>
+              <a:solidFill>
+                <a:srgbClr val="9AA8BC"/>
+              </a:solidFill>
+              <a:ln>
+                <a:noFill/>
+              </a:ln>
+            </p:spPr>
+            <p:style>
+              <a:lnRef idx="2">
+                <a:schemeClr val="accent1">
+                  <a:shade val="50000"/>
+                </a:schemeClr>
+              </a:lnRef>
+              <a:fillRef idx="1">
+                <a:schemeClr val="accent1"/>
+              </a:fillRef>
+              <a:effectRef idx="0">
+                <a:schemeClr val="accent1"/>
+              </a:effectRef>
+              <a:fontRef idx="minor">
+                <a:schemeClr val="lt1"/>
+              </a:fontRef>
+            </p:style>
+            <p:txBody>
+              <a:bodyPr rtlCol="0" anchor="ctr"/>
+              <a:lstStyle>
+                <a:defPPr>
+                  <a:defRPr lang="en-US"/>
+                </a:defPPr>
+                <a:lvl1pPr algn="ctr">
+                  <a:defRPr>
+                    <a:solidFill>
+                      <a:schemeClr val="tx1"/>
+                    </a:solidFill>
+                    <a:latin typeface="Arial" panose="020B0604020202020204" pitchFamily="34" charset="0"/>
+                    <a:cs typeface="Arial" panose="020B0604020202020204" pitchFamily="34" charset="0"/>
+                  </a:defRPr>
+                </a:lvl1pPr>
+                <a:lvl2pPr>
+                  <a:defRPr>
+                    <a:solidFill>
+                      <a:schemeClr val="lt1"/>
+                    </a:solidFill>
+                  </a:defRPr>
+                </a:lvl2pPr>
+                <a:lvl3pPr>
+                  <a:defRPr>
+                    <a:solidFill>
+                      <a:schemeClr val="lt1"/>
+                    </a:solidFill>
+                  </a:defRPr>
+                </a:lvl3pPr>
+                <a:lvl4pPr>
+                  <a:defRPr>
+                    <a:solidFill>
+                      <a:schemeClr val="lt1"/>
+                    </a:solidFill>
+                  </a:defRPr>
+                </a:lvl4pPr>
+                <a:lvl5pPr>
+                  <a:defRPr>
+                    <a:solidFill>
+                      <a:schemeClr val="lt1"/>
+                    </a:solidFill>
+                  </a:defRPr>
+                </a:lvl5pPr>
+                <a:lvl6pPr>
+                  <a:defRPr>
+                    <a:solidFill>
+                      <a:schemeClr val="lt1"/>
+                    </a:solidFill>
+                  </a:defRPr>
+                </a:lvl6pPr>
+                <a:lvl7pPr>
+                  <a:defRPr>
+                    <a:solidFill>
+                      <a:schemeClr val="lt1"/>
+                    </a:solidFill>
+                  </a:defRPr>
+                </a:lvl7pPr>
+                <a:lvl8pPr>
+                  <a:defRPr>
+                    <a:solidFill>
+                      <a:schemeClr val="lt1"/>
+                    </a:solidFill>
+                  </a:defRPr>
+                </a:lvl8pPr>
+                <a:lvl9pPr>
+                  <a:defRPr>
+                    <a:solidFill>
+                      <a:schemeClr val="lt1"/>
+                    </a:solidFill>
+                  </a:defRPr>
+                </a:lvl9pPr>
+              </a:lstStyle>
+              <a:p>
+                <a:r>
+                  <a:rPr lang="en-AU" dirty="0">
+                    <a:latin typeface="Roboto" panose="02000000000000000000" pitchFamily="2" charset="0"/>
+                    <a:ea typeface="Roboto" panose="02000000000000000000" pitchFamily="2" charset="0"/>
+                  </a:rPr>
+                  <a:t>Obj reference</a:t>
+                </a:r>
+              </a:p>
+            </p:txBody>
+          </p:sp>
+          <p:sp>
+            <p:nvSpPr>
+              <p:cNvPr id="5" name="TextBox 4">
+                <a:extLst>
+                  <a:ext uri="{FF2B5EF4-FFF2-40B4-BE49-F238E27FC236}">
+                    <a16:creationId xmlns:a16="http://schemas.microsoft.com/office/drawing/2014/main" id="{84CD4ECC-2606-9745-A884-EF8CA54A50F8}"/>
+                  </a:ext>
+                </a:extLst>
+              </p:cNvPr>
+              <p:cNvSpPr txBox="1"/>
+              <p:nvPr/>
+            </p:nvSpPr>
+            <p:spPr>
+              <a:xfrm>
+                <a:off x="2760714" y="3911415"/>
+                <a:ext cx="1191639" cy="253815"/>
+              </a:xfrm>
+              <a:prstGeom prst="rect">
+                <a:avLst/>
+              </a:prstGeom>
+              <a:solidFill>
+                <a:srgbClr val="C59C52"/>
+              </a:solidFill>
+              <a:ln>
+                <a:noFill/>
+              </a:ln>
+            </p:spPr>
+            <p:style>
+              <a:lnRef idx="2">
+                <a:schemeClr val="accent1">
+                  <a:shade val="50000"/>
+                </a:schemeClr>
+              </a:lnRef>
+              <a:fillRef idx="1">
+                <a:schemeClr val="accent1"/>
+              </a:fillRef>
+              <a:effectRef idx="0">
+                <a:schemeClr val="accent1"/>
+              </a:effectRef>
+              <a:fontRef idx="minor">
+                <a:schemeClr val="lt1"/>
+              </a:fontRef>
+            </p:style>
+            <p:txBody>
+              <a:bodyPr rtlCol="0" anchor="ctr"/>
+              <a:lstStyle>
+                <a:defPPr>
+                  <a:defRPr lang="en-US"/>
+                </a:defPPr>
+                <a:lvl1pPr algn="ctr">
+                  <a:defRPr>
+                    <a:solidFill>
+                      <a:schemeClr val="bg1"/>
+                    </a:solidFill>
+                    <a:latin typeface="Arial" panose="020B0604020202020204" pitchFamily="34" charset="0"/>
+                    <a:cs typeface="Arial" panose="020B0604020202020204" pitchFamily="34" charset="0"/>
+                  </a:defRPr>
+                </a:lvl1pPr>
+                <a:lvl2pPr>
+                  <a:defRPr>
+                    <a:solidFill>
+                      <a:schemeClr val="lt1"/>
+                    </a:solidFill>
+                  </a:defRPr>
+                </a:lvl2pPr>
+                <a:lvl3pPr>
+                  <a:defRPr>
+                    <a:solidFill>
+                      <a:schemeClr val="lt1"/>
+                    </a:solidFill>
+                  </a:defRPr>
+                </a:lvl3pPr>
+                <a:lvl4pPr>
+                  <a:defRPr>
+                    <a:solidFill>
+                      <a:schemeClr val="lt1"/>
+                    </a:solidFill>
+                  </a:defRPr>
+                </a:lvl4pPr>
+                <a:lvl5pPr>
+                  <a:defRPr>
+                    <a:solidFill>
+                      <a:schemeClr val="lt1"/>
+                    </a:solidFill>
+                  </a:defRPr>
+                </a:lvl5pPr>
+                <a:lvl6pPr>
+                  <a:defRPr>
+                    <a:solidFill>
+                      <a:schemeClr val="lt1"/>
+                    </a:solidFill>
+                  </a:defRPr>
+                </a:lvl6pPr>
+                <a:lvl7pPr>
+                  <a:defRPr>
+                    <a:solidFill>
+                      <a:schemeClr val="lt1"/>
+                    </a:solidFill>
+                  </a:defRPr>
+                </a:lvl7pPr>
+                <a:lvl8pPr>
+                  <a:defRPr>
+                    <a:solidFill>
+                      <a:schemeClr val="lt1"/>
+                    </a:solidFill>
+                  </a:defRPr>
+                </a:lvl8pPr>
+                <a:lvl9pPr>
+                  <a:defRPr>
+                    <a:solidFill>
+                      <a:schemeClr val="lt1"/>
+                    </a:solidFill>
+                  </a:defRPr>
+                </a:lvl9pPr>
+              </a:lstStyle>
+              <a:p>
+                <a:r>
+                  <a:rPr lang="en-AU" dirty="0">
+                    <a:latin typeface="Roboto" panose="02000000000000000000" pitchFamily="2" charset="0"/>
+                    <a:ea typeface="Roboto" panose="02000000000000000000" pitchFamily="2" charset="0"/>
+                  </a:rPr>
+                  <a:t>Access rights</a:t>
+                </a:r>
+              </a:p>
+            </p:txBody>
+          </p:sp>
+        </p:grpSp>
+        <p:grpSp>
+          <p:nvGrpSpPr>
+            <p:cNvPr id="8" name="Group 19">
+              <a:extLst>
+                <a:ext uri="{FF2B5EF4-FFF2-40B4-BE49-F238E27FC236}">
+                  <a16:creationId xmlns:a16="http://schemas.microsoft.com/office/drawing/2014/main" id="{DE4BB33B-9B66-2545-9206-22918F4D8580}"/>
+                </a:ext>
+              </a:extLst>
+            </p:cNvPr>
+            <p:cNvGrpSpPr/>
+            <p:nvPr/>
+          </p:nvGrpSpPr>
+          <p:grpSpPr>
+            <a:xfrm>
+              <a:off x="3635896" y="1818493"/>
+              <a:ext cx="1753222" cy="1113297"/>
+              <a:chOff x="4343401" y="2227091"/>
+              <a:chExt cx="1314917" cy="834973"/>
+            </a:xfrm>
+          </p:grpSpPr>
+          <p:sp>
+            <p:nvSpPr>
+              <p:cNvPr id="9" name="Rectangle 8">
+                <a:extLst>
+                  <a:ext uri="{FF2B5EF4-FFF2-40B4-BE49-F238E27FC236}">
+                    <a16:creationId xmlns:a16="http://schemas.microsoft.com/office/drawing/2014/main" id="{87320FE3-E341-A147-B4E7-72895AC53BC6}"/>
+                  </a:ext>
+                </a:extLst>
+              </p:cNvPr>
+              <p:cNvSpPr/>
+              <p:nvPr/>
+            </p:nvSpPr>
+            <p:spPr>
+              <a:xfrm>
+                <a:off x="4343401" y="2227091"/>
+                <a:ext cx="1314917" cy="834973"/>
+              </a:xfrm>
+              <a:prstGeom prst="rect">
+                <a:avLst/>
+              </a:prstGeom>
+              <a:solidFill>
+                <a:srgbClr val="9AA8BC"/>
+              </a:solidFill>
+              <a:ln>
+                <a:noFill/>
+              </a:ln>
+            </p:spPr>
+            <p:style>
+              <a:lnRef idx="2">
+                <a:schemeClr val="accent1">
+                  <a:shade val="50000"/>
+                </a:schemeClr>
+              </a:lnRef>
+              <a:fillRef idx="1">
+                <a:schemeClr val="accent1"/>
+              </a:fillRef>
+              <a:effectRef idx="0">
+                <a:schemeClr val="accent1"/>
+              </a:effectRef>
+              <a:fontRef idx="minor">
+                <a:schemeClr val="lt1"/>
+              </a:fontRef>
+            </p:style>
+            <p:txBody>
+              <a:bodyPr rtlCol="0" anchor="ctr"/>
+              <a:lstStyle/>
+              <a:p>
+                <a:pPr algn="r"/>
+                <a:r>
+                  <a:rPr lang="en-AU" dirty="0">
+                    <a:solidFill>
+                      <a:schemeClr val="tx1"/>
+                    </a:solidFill>
+                    <a:latin typeface="Roboto" panose="02000000000000000000" pitchFamily="2" charset="0"/>
+                    <a:ea typeface="Roboto" panose="02000000000000000000" pitchFamily="2" charset="0"/>
+                    <a:cs typeface="Arial" panose="020B0604020202020204" pitchFamily="34" charset="0"/>
+                  </a:rPr>
+                  <a:t>Object</a:t>
+                </a:r>
+              </a:p>
+            </p:txBody>
+          </p:sp>
+          <p:pic>
+            <p:nvPicPr>
+              <p:cNvPr id="10" name="Picture 9" descr="lock-l.png">
+                <a:extLst>
+                  <a:ext uri="{FF2B5EF4-FFF2-40B4-BE49-F238E27FC236}">
+                    <a16:creationId xmlns:a16="http://schemas.microsoft.com/office/drawing/2014/main" id="{94874EDF-1484-6A48-A5B2-C97E5A743482}"/>
+                  </a:ext>
+                </a:extLst>
+              </p:cNvPr>
+              <p:cNvPicPr>
+                <a:picLocks noChangeAspect="1"/>
+              </p:cNvPicPr>
+              <p:nvPr/>
+            </p:nvPicPr>
+            <p:blipFill>
+              <a:blip r:embed="rId3"/>
+              <a:stretch>
+                <a:fillRect/>
+              </a:stretch>
+            </p:blipFill>
+            <p:spPr>
+              <a:xfrm>
+                <a:off x="4432641" y="2317058"/>
+                <a:ext cx="504825" cy="609600"/>
+              </a:xfrm>
+              <a:prstGeom prst="rect">
+                <a:avLst/>
+              </a:prstGeom>
+            </p:spPr>
+          </p:pic>
+        </p:grpSp>
+        <p:cxnSp>
+          <p:nvCxnSpPr>
+            <p:cNvPr id="7" name="Straight Arrow Connector 6">
+              <a:extLst>
+                <a:ext uri="{FF2B5EF4-FFF2-40B4-BE49-F238E27FC236}">
+                  <a16:creationId xmlns:a16="http://schemas.microsoft.com/office/drawing/2014/main" id="{2B66F578-FA9D-6B47-9CE9-3E30732D390A}"/>
+                </a:ext>
+              </a:extLst>
+            </p:cNvPr>
+            <p:cNvCxnSpPr>
+              <a:cxnSpLocks/>
+              <a:stCxn id="4" idx="3"/>
+              <a:endCxn id="10" idx="1"/>
+            </p:cNvCxnSpPr>
+            <p:nvPr/>
+          </p:nvCxnSpPr>
+          <p:spPr>
+            <a:xfrm flipV="1">
+              <a:off x="2698228" y="2344849"/>
+              <a:ext cx="1056655" cy="338420"/>
+            </a:xfrm>
+            <a:prstGeom prst="straightConnector1">
+              <a:avLst/>
+            </a:prstGeom>
+            <a:ln w="57150" cap="flat" cmpd="sng" algn="ctr">
+              <a:solidFill>
+                <a:schemeClr val="accent4"/>
+              </a:solidFill>
+              <a:prstDash val="solid"/>
+              <a:round/>
+              <a:headEnd type="none" w="med" len="med"/>
+              <a:tailEnd type="arrow" w="med" len="med"/>
+            </a:ln>
+          </p:spPr>
+          <p:style>
+            <a:lnRef idx="2">
+              <a:schemeClr val="accent1"/>
+            </a:lnRef>
+            <a:fillRef idx="0">
+              <a:schemeClr val="accent1"/>
+            </a:fillRef>
+            <a:effectRef idx="1">
+              <a:schemeClr val="accent1"/>
+            </a:effectRef>
+            <a:fontRef idx="minor">
+              <a:schemeClr val="tx1"/>
+            </a:fontRef>
+          </p:style>
+        </p:cxnSp>
+      </p:grpSp>
+      <p:sp>
+        <p:nvSpPr>
+          <p:cNvPr id="6" name="Title 5">
+            <a:extLst>
+              <a:ext uri="{FF2B5EF4-FFF2-40B4-BE49-F238E27FC236}">
+                <a16:creationId xmlns:a16="http://schemas.microsoft.com/office/drawing/2014/main" id="{F9BFCFCF-B6E9-D342-B347-225B443F5FC1}"/>
+              </a:ext>
+            </a:extLst>
+          </p:cNvPr>
+          <p:cNvSpPr>
+            <a:spLocks noGrp="1"/>
+          </p:cNvSpPr>
+          <p:nvPr>
+            <p:ph type="title"/>
+          </p:nvPr>
+        </p:nvSpPr>
+        <p:spPr/>
+        <p:txBody>
+          <a:bodyPr>
+            <a:normAutofit/>
+          </a:bodyPr>
+          <a:lstStyle/>
+          <a:p>
+            <a:r>
+              <a:rPr lang="en-AU" dirty="0">
+                <a:latin typeface="Roboto" panose="02000000000000000000" pitchFamily="2" charset="0"/>
+                <a:ea typeface="Roboto" panose="02000000000000000000" pitchFamily="2" charset="0"/>
+              </a:rPr>
+              <a:t>cap</a:t>
+            </a:r>
+          </a:p>
+        </p:txBody>
+      </p:sp>
+    </p:spTree>
+    <p:extLst>
+      <p:ext uri="{BB962C8B-B14F-4D97-AF65-F5344CB8AC3E}">
+        <p14:creationId xmlns:p14="http://schemas.microsoft.com/office/powerpoint/2010/main" val="3624242860"/>
+      </p:ext>
+    </p:extLst>
+  </p:cSld>
+  <p:clrMapOvr>
+    <a:masterClrMapping/>
+  </p:clrMapOvr>
+</p:sld>
+</file>
+
+<file path=ppt/slides/slide11.xml><?xml version="1.0" encoding="utf-8"?>
+<p:sld xmlns:a="http://schemas.openxmlformats.org/drawingml/2006/main" xmlns:r="http://schemas.openxmlformats.org/officeDocument/2006/relationships" xmlns:p="http://schemas.openxmlformats.org/presentationml/2006/main">
+  <p:cSld>
+    <p:spTree>
+      <p:nvGrpSpPr>
+        <p:cNvPr id="1" name=""/>
+        <p:cNvGrpSpPr/>
+        <p:nvPr/>
+      </p:nvGrpSpPr>
+      <p:grpSpPr>
+        <a:xfrm>
+          <a:off x="0" y="0"/>
+          <a:ext cx="0" cy="0"/>
+          <a:chOff x="0" y="0"/>
+          <a:chExt cx="0" cy="0"/>
+        </a:xfrm>
+      </p:grpSpPr>
+      <p:grpSp>
+        <p:nvGrpSpPr>
           <p:cNvPr id="3" name="Group 2">
             <a:extLst>
               <a:ext uri="{FF2B5EF4-FFF2-40B4-BE49-F238E27FC236}">
@@ -8821,7 +9464,7 @@
 </p:sld>
 </file>
 
-<file path=ppt/slides/slide11.xml><?xml version="1.0" encoding="utf-8"?>
+<file path=ppt/slides/slide12.xml><?xml version="1.0" encoding="utf-8"?>
 <p:sld xmlns:a="http://schemas.openxmlformats.org/drawingml/2006/main" xmlns:r="http://schemas.openxmlformats.org/officeDocument/2006/relationships" xmlns:p="http://schemas.openxmlformats.org/presentationml/2006/main">
   <p:cSld>
     <p:spTree>
@@ -10141,7 +10784,7 @@
 </p:sld>
 </file>
 
-<file path=ppt/slides/slide12.xml><?xml version="1.0" encoding="utf-8"?>
+<file path=ppt/slides/slide13.xml><?xml version="1.0" encoding="utf-8"?>
 <p:sld xmlns:a="http://schemas.openxmlformats.org/drawingml/2006/main" xmlns:r="http://schemas.openxmlformats.org/officeDocument/2006/relationships" xmlns:p="http://schemas.openxmlformats.org/presentationml/2006/main">
   <p:cSld>
     <p:spTree>
@@ -14046,7 +14689,7 @@
 </p:sld>
 </file>
 
-<file path=ppt/slides/slide13.xml><?xml version="1.0" encoding="utf-8"?>
+<file path=ppt/slides/slide14.xml><?xml version="1.0" encoding="utf-8"?>
 <p:sld xmlns:a="http://schemas.openxmlformats.org/drawingml/2006/main" xmlns:r="http://schemas.openxmlformats.org/officeDocument/2006/relationships" xmlns:p="http://schemas.openxmlformats.org/presentationml/2006/main">
   <p:cSld>
     <p:spTree>
@@ -14167,7 +14810,7 @@
 </p:sld>
 </file>
 
-<file path=ppt/slides/slide14.xml><?xml version="1.0" encoding="utf-8"?>
+<file path=ppt/slides/slide15.xml><?xml version="1.0" encoding="utf-8"?>
 <p:sld xmlns:a="http://schemas.openxmlformats.org/drawingml/2006/main" xmlns:r="http://schemas.openxmlformats.org/officeDocument/2006/relationships" xmlns:p="http://schemas.openxmlformats.org/presentationml/2006/main">
   <p:cSld>
     <p:spTree>
@@ -15124,7 +15767,7 @@
 </p:sld>
 </file>
 
-<file path=ppt/slides/slide15.xml><?xml version="1.0" encoding="utf-8"?>
+<file path=ppt/slides/slide16.xml><?xml version="1.0" encoding="utf-8"?>
 <p:sld xmlns:a="http://schemas.openxmlformats.org/drawingml/2006/main" xmlns:r="http://schemas.openxmlformats.org/officeDocument/2006/relationships" xmlns:p="http://schemas.openxmlformats.org/presentationml/2006/main">
   <p:cSld>
     <p:spTree>
@@ -27027,6 +27670,837 @@
       </p:grpSpPr>
       <p:grpSp>
         <p:nvGrpSpPr>
+          <p:cNvPr id="21" name="Group 20">
+            <a:extLst>
+              <a:ext uri="{FF2B5EF4-FFF2-40B4-BE49-F238E27FC236}">
+                <a16:creationId xmlns:a16="http://schemas.microsoft.com/office/drawing/2014/main" id="{2071DE8B-BDC5-C579-6B12-FB5DA128F6C0}"/>
+              </a:ext>
+            </a:extLst>
+          </p:cNvPr>
+          <p:cNvGrpSpPr/>
+          <p:nvPr/>
+        </p:nvGrpSpPr>
+        <p:grpSpPr>
+          <a:xfrm>
+            <a:off x="3275856" y="2060848"/>
+            <a:ext cx="4968552" cy="2745596"/>
+            <a:chOff x="2339752" y="1563638"/>
+            <a:chExt cx="4968552" cy="2745596"/>
+          </a:xfrm>
+        </p:grpSpPr>
+        <p:grpSp>
+          <p:nvGrpSpPr>
+            <p:cNvPr id="2" name="Group 1">
+              <a:extLst>
+                <a:ext uri="{FF2B5EF4-FFF2-40B4-BE49-F238E27FC236}">
+                  <a16:creationId xmlns:a16="http://schemas.microsoft.com/office/drawing/2014/main" id="{9208AA75-1A5B-116F-7B8A-A93A3B09038C}"/>
+                </a:ext>
+              </a:extLst>
+            </p:cNvPr>
+            <p:cNvGrpSpPr/>
+            <p:nvPr/>
+          </p:nvGrpSpPr>
+          <p:grpSpPr>
+            <a:xfrm>
+              <a:off x="2339752" y="1563638"/>
+              <a:ext cx="1653659" cy="2009851"/>
+              <a:chOff x="1738110" y="1563638"/>
+              <a:chExt cx="1653659" cy="2009851"/>
+            </a:xfrm>
+          </p:grpSpPr>
+          <p:sp>
+            <p:nvSpPr>
+              <p:cNvPr id="5" name="Rectangle 4">
+                <a:extLst>
+                  <a:ext uri="{FF2B5EF4-FFF2-40B4-BE49-F238E27FC236}">
+                    <a16:creationId xmlns:a16="http://schemas.microsoft.com/office/drawing/2014/main" id="{34F20BC9-62BA-2188-43A7-B1F774AF4D44}"/>
+                  </a:ext>
+                </a:extLst>
+              </p:cNvPr>
+              <p:cNvSpPr/>
+              <p:nvPr/>
+            </p:nvSpPr>
+            <p:spPr>
+              <a:xfrm>
+                <a:off x="1738110" y="1563638"/>
+                <a:ext cx="1653530" cy="2009851"/>
+              </a:xfrm>
+              <a:prstGeom prst="rect">
+                <a:avLst/>
+              </a:prstGeom>
+              <a:solidFill>
+                <a:srgbClr val="CBE4AA"/>
+              </a:solidFill>
+              <a:ln>
+                <a:noFill/>
+              </a:ln>
+            </p:spPr>
+            <p:style>
+              <a:lnRef idx="2">
+                <a:schemeClr val="accent1">
+                  <a:shade val="50000"/>
+                </a:schemeClr>
+              </a:lnRef>
+              <a:fillRef idx="1">
+                <a:schemeClr val="accent1"/>
+              </a:fillRef>
+              <a:effectRef idx="0">
+                <a:schemeClr val="accent1"/>
+              </a:effectRef>
+              <a:fontRef idx="minor">
+                <a:schemeClr val="lt1"/>
+              </a:fontRef>
+            </p:style>
+            <p:txBody>
+              <a:bodyPr rtlCol="0" anchor="t"/>
+              <a:lstStyle/>
+              <a:p>
+                <a:pPr algn="ctr"/>
+                <a:r>
+                  <a:rPr lang="en-AU" dirty="0">
+                    <a:solidFill>
+                      <a:schemeClr val="tx1"/>
+                    </a:solidFill>
+                    <a:latin typeface="Roboto" panose="02000000000000000000" pitchFamily="2" charset="0"/>
+                    <a:ea typeface="Roboto" panose="02000000000000000000" pitchFamily="2" charset="0"/>
+                  </a:rPr>
+                  <a:t>Protection Domain 1</a:t>
+                </a:r>
+              </a:p>
+            </p:txBody>
+          </p:sp>
+          <p:sp>
+            <p:nvSpPr>
+              <p:cNvPr id="6" name="TextBox 5">
+                <a:extLst>
+                  <a:ext uri="{FF2B5EF4-FFF2-40B4-BE49-F238E27FC236}">
+                    <a16:creationId xmlns:a16="http://schemas.microsoft.com/office/drawing/2014/main" id="{80930EA4-E5CA-8A56-28E6-90283D8A6DC4}"/>
+                  </a:ext>
+                </a:extLst>
+              </p:cNvPr>
+              <p:cNvSpPr txBox="1"/>
+              <p:nvPr/>
+            </p:nvSpPr>
+            <p:spPr>
+              <a:xfrm>
+                <a:off x="1738110" y="2213575"/>
+                <a:ext cx="954177" cy="338554"/>
+              </a:xfrm>
+              <a:prstGeom prst="rect">
+                <a:avLst/>
+              </a:prstGeom>
+              <a:solidFill>
+                <a:srgbClr val="008F00"/>
+              </a:solidFill>
+            </p:spPr>
+            <p:txBody>
+              <a:bodyPr wrap="square" rtlCol="0" anchor="ctr">
+                <a:spAutoFit/>
+              </a:bodyPr>
+              <a:lstStyle/>
+              <a:p>
+                <a:pPr algn="ctr"/>
+                <a:r>
+                  <a:rPr lang="en-US" sz="1600" dirty="0" err="1">
+                    <a:solidFill>
+                      <a:schemeClr val="bg1"/>
+                    </a:solidFill>
+                    <a:latin typeface="Roboto" panose="02000000000000000000" pitchFamily="2" charset="0"/>
+                    <a:ea typeface="Roboto" panose="02000000000000000000" pitchFamily="2" charset="0"/>
+                  </a:rPr>
+                  <a:t>init</a:t>
+                </a:r>
+                <a:r>
+                  <a:rPr lang="en-US" sz="1600" dirty="0">
+                    <a:solidFill>
+                      <a:schemeClr val="bg1"/>
+                    </a:solidFill>
+                    <a:latin typeface="Roboto" panose="02000000000000000000" pitchFamily="2" charset="0"/>
+                    <a:ea typeface="Roboto" panose="02000000000000000000" pitchFamily="2" charset="0"/>
+                  </a:rPr>
+                  <a:t>(…)</a:t>
+                </a:r>
+              </a:p>
+            </p:txBody>
+          </p:sp>
+          <p:sp>
+            <p:nvSpPr>
+              <p:cNvPr id="10" name="TextBox 9">
+                <a:extLst>
+                  <a:ext uri="{FF2B5EF4-FFF2-40B4-BE49-F238E27FC236}">
+                    <a16:creationId xmlns:a16="http://schemas.microsoft.com/office/drawing/2014/main" id="{6EC998E4-0F1B-817C-650C-F5F6E164AE35}"/>
+                  </a:ext>
+                </a:extLst>
+              </p:cNvPr>
+              <p:cNvSpPr txBox="1"/>
+              <p:nvPr/>
+            </p:nvSpPr>
+            <p:spPr>
+              <a:xfrm>
+                <a:off x="1907576" y="2671334"/>
+                <a:ext cx="1484129" cy="338554"/>
+              </a:xfrm>
+              <a:prstGeom prst="rect">
+                <a:avLst/>
+              </a:prstGeom>
+              <a:solidFill>
+                <a:srgbClr val="008F00"/>
+              </a:solidFill>
+            </p:spPr>
+            <p:txBody>
+              <a:bodyPr wrap="square" rtlCol="0" anchor="ctr">
+                <a:spAutoFit/>
+              </a:bodyPr>
+              <a:lstStyle/>
+              <a:p>
+                <a:pPr algn="ctr"/>
+                <a:r>
+                  <a:rPr lang="en-US" sz="1600" dirty="0">
+                    <a:solidFill>
+                      <a:schemeClr val="bg1"/>
+                    </a:solidFill>
+                    <a:latin typeface="Roboto" panose="02000000000000000000" pitchFamily="2" charset="0"/>
+                    <a:ea typeface="Roboto" panose="02000000000000000000" pitchFamily="2" charset="0"/>
+                  </a:rPr>
+                  <a:t>notified(…)</a:t>
+                </a:r>
+              </a:p>
+            </p:txBody>
+          </p:sp>
+          <p:sp>
+            <p:nvSpPr>
+              <p:cNvPr id="11" name="TextBox 10">
+                <a:extLst>
+                  <a:ext uri="{FF2B5EF4-FFF2-40B4-BE49-F238E27FC236}">
+                    <a16:creationId xmlns:a16="http://schemas.microsoft.com/office/drawing/2014/main" id="{E4D08701-04B5-81AA-6CC0-168C960B2540}"/>
+                  </a:ext>
+                </a:extLst>
+              </p:cNvPr>
+              <p:cNvSpPr txBox="1"/>
+              <p:nvPr/>
+            </p:nvSpPr>
+            <p:spPr>
+              <a:xfrm>
+                <a:off x="1907640" y="3129377"/>
+                <a:ext cx="1484129" cy="338554"/>
+              </a:xfrm>
+              <a:prstGeom prst="rect">
+                <a:avLst/>
+              </a:prstGeom>
+              <a:solidFill>
+                <a:srgbClr val="008F00"/>
+              </a:solidFill>
+            </p:spPr>
+            <p:txBody>
+              <a:bodyPr wrap="square" rtlCol="0" anchor="ctr">
+                <a:spAutoFit/>
+              </a:bodyPr>
+              <a:lstStyle/>
+              <a:p>
+                <a:pPr algn="ctr"/>
+                <a:r>
+                  <a:rPr lang="en-US" sz="1600" dirty="0">
+                    <a:solidFill>
+                      <a:schemeClr val="bg1"/>
+                    </a:solidFill>
+                    <a:latin typeface="Roboto" panose="02000000000000000000" pitchFamily="2" charset="0"/>
+                    <a:ea typeface="Roboto" panose="02000000000000000000" pitchFamily="2" charset="0"/>
+                  </a:rPr>
+                  <a:t>protected(…)</a:t>
+                </a:r>
+              </a:p>
+            </p:txBody>
+          </p:sp>
+        </p:grpSp>
+        <p:sp>
+          <p:nvSpPr>
+            <p:cNvPr id="14" name="TextBox 13">
+              <a:extLst>
+                <a:ext uri="{FF2B5EF4-FFF2-40B4-BE49-F238E27FC236}">
+                  <a16:creationId xmlns:a16="http://schemas.microsoft.com/office/drawing/2014/main" id="{20F375B8-230F-B7A5-5EBD-9DF5DFE7366B}"/>
+                </a:ext>
+              </a:extLst>
+            </p:cNvPr>
+            <p:cNvSpPr txBox="1"/>
+            <p:nvPr/>
+          </p:nvSpPr>
+          <p:spPr>
+            <a:xfrm>
+              <a:off x="3565332" y="3939902"/>
+              <a:ext cx="2708435" cy="369332"/>
+            </a:xfrm>
+            <a:prstGeom prst="rect">
+              <a:avLst/>
+            </a:prstGeom>
+            <a:solidFill>
+              <a:schemeClr val="tx1"/>
+            </a:solidFill>
+          </p:spPr>
+          <p:txBody>
+            <a:bodyPr wrap="square" rtlCol="0">
+              <a:spAutoFit/>
+            </a:bodyPr>
+            <a:lstStyle/>
+            <a:p>
+              <a:pPr algn="ctr"/>
+              <a:r>
+                <a:rPr lang="en-US" dirty="0">
+                  <a:solidFill>
+                    <a:schemeClr val="bg1"/>
+                  </a:solidFill>
+                  <a:latin typeface="Roboto" panose="02000000000000000000" pitchFamily="2" charset="0"/>
+                  <a:ea typeface="Roboto" panose="02000000000000000000" pitchFamily="2" charset="0"/>
+                </a:rPr>
+                <a:t>Memory Region</a:t>
+              </a:r>
+            </a:p>
+          </p:txBody>
+        </p:sp>
+        <p:cxnSp>
+          <p:nvCxnSpPr>
+            <p:cNvPr id="16" name="Straight Arrow Connector 15">
+              <a:extLst>
+                <a:ext uri="{FF2B5EF4-FFF2-40B4-BE49-F238E27FC236}">
+                  <a16:creationId xmlns:a16="http://schemas.microsoft.com/office/drawing/2014/main" id="{E8671D84-B085-429B-5D10-1EBAA41A5093}"/>
+                </a:ext>
+              </a:extLst>
+            </p:cNvPr>
+            <p:cNvCxnSpPr>
+              <a:cxnSpLocks/>
+              <a:stCxn id="10" idx="3"/>
+            </p:cNvCxnSpPr>
+            <p:nvPr/>
+          </p:nvCxnSpPr>
+          <p:spPr>
+            <a:xfrm>
+              <a:off x="3993347" y="2840611"/>
+              <a:ext cx="1828358" cy="1795"/>
+            </a:xfrm>
+            <a:prstGeom prst="straightConnector1">
+              <a:avLst/>
+            </a:prstGeom>
+            <a:ln w="50800">
+              <a:solidFill>
+                <a:srgbClr val="C59C52"/>
+              </a:solidFill>
+              <a:headEnd type="triangle"/>
+              <a:tailEnd type="triangle"/>
+            </a:ln>
+          </p:spPr>
+          <p:style>
+            <a:lnRef idx="2">
+              <a:schemeClr val="accent2">
+                <a:shade val="50000"/>
+              </a:schemeClr>
+            </a:lnRef>
+            <a:fillRef idx="1">
+              <a:schemeClr val="accent2"/>
+            </a:fillRef>
+            <a:effectRef idx="0">
+              <a:schemeClr val="accent2"/>
+            </a:effectRef>
+            <a:fontRef idx="minor">
+              <a:schemeClr val="lt1"/>
+            </a:fontRef>
+          </p:style>
+        </p:cxnSp>
+        <p:sp>
+          <p:nvSpPr>
+            <p:cNvPr id="19" name="TextBox 18">
+              <a:extLst>
+                <a:ext uri="{FF2B5EF4-FFF2-40B4-BE49-F238E27FC236}">
+                  <a16:creationId xmlns:a16="http://schemas.microsoft.com/office/drawing/2014/main" id="{FDF88046-31A7-30B6-33D5-BEA7D78D1354}"/>
+                </a:ext>
+              </a:extLst>
+            </p:cNvPr>
+            <p:cNvSpPr txBox="1"/>
+            <p:nvPr/>
+          </p:nvSpPr>
+          <p:spPr>
+            <a:xfrm>
+              <a:off x="4017397" y="1995686"/>
+              <a:ext cx="1804307" cy="646331"/>
+            </a:xfrm>
+            <a:prstGeom prst="rect">
+              <a:avLst/>
+            </a:prstGeom>
+            <a:noFill/>
+            <a:ln>
+              <a:noFill/>
+            </a:ln>
+          </p:spPr>
+          <p:txBody>
+            <a:bodyPr wrap="square" rtlCol="0">
+              <a:spAutoFit/>
+            </a:bodyPr>
+            <a:lstStyle>
+              <a:defPPr>
+                <a:defRPr lang="en-AU"/>
+              </a:defPPr>
+              <a:lvl1pPr algn="ctr">
+                <a:defRPr sz="1800">
+                  <a:solidFill>
+                    <a:srgbClr val="C59C52"/>
+                  </a:solidFill>
+                  <a:latin typeface="Roboto" panose="02000000000000000000" pitchFamily="2" charset="0"/>
+                  <a:ea typeface="Roboto" panose="02000000000000000000" pitchFamily="2" charset="0"/>
+                </a:defRPr>
+              </a:lvl1pPr>
+            </a:lstStyle>
+            <a:p>
+              <a:r>
+                <a:rPr lang="en-US" dirty="0"/>
+                <a:t>Communication Cannel</a:t>
+              </a:r>
+            </a:p>
+          </p:txBody>
+        </p:sp>
+        <p:grpSp>
+          <p:nvGrpSpPr>
+            <p:cNvPr id="27" name="Group 26">
+              <a:extLst>
+                <a:ext uri="{FF2B5EF4-FFF2-40B4-BE49-F238E27FC236}">
+                  <a16:creationId xmlns:a16="http://schemas.microsoft.com/office/drawing/2014/main" id="{9B853A64-A4FB-6A67-8B24-D86B061C17DE}"/>
+                </a:ext>
+              </a:extLst>
+            </p:cNvPr>
+            <p:cNvGrpSpPr/>
+            <p:nvPr/>
+          </p:nvGrpSpPr>
+          <p:grpSpPr>
+            <a:xfrm flipH="1">
+              <a:off x="3993411" y="2809261"/>
+              <a:ext cx="1875604" cy="812413"/>
+              <a:chOff x="2665435" y="2919536"/>
+              <a:chExt cx="2500806" cy="1083217"/>
+            </a:xfrm>
+          </p:grpSpPr>
+          <p:cxnSp>
+            <p:nvCxnSpPr>
+              <p:cNvPr id="18" name="Straight Arrow Connector 17">
+                <a:extLst>
+                  <a:ext uri="{FF2B5EF4-FFF2-40B4-BE49-F238E27FC236}">
+                    <a16:creationId xmlns:a16="http://schemas.microsoft.com/office/drawing/2014/main" id="{231981D7-6D96-2B73-669F-7F2F17452D42}"/>
+                  </a:ext>
+                </a:extLst>
+              </p:cNvPr>
+              <p:cNvCxnSpPr>
+                <a:cxnSpLocks/>
+                <a:stCxn id="11" idx="3"/>
+              </p:cNvCxnSpPr>
+              <p:nvPr/>
+            </p:nvCxnSpPr>
+            <p:spPr>
+              <a:xfrm flipH="1">
+                <a:off x="2745754" y="3572063"/>
+                <a:ext cx="2420487" cy="1271"/>
+              </a:xfrm>
+              <a:prstGeom prst="straightConnector1">
+                <a:avLst/>
+              </a:prstGeom>
+              <a:ln w="50800">
+                <a:solidFill>
+                  <a:srgbClr val="C59C52"/>
+                </a:solidFill>
+                <a:headEnd type="triangle" w="med" len="med"/>
+                <a:tailEnd type="none" w="med" len="med"/>
+              </a:ln>
+            </p:spPr>
+            <p:style>
+              <a:lnRef idx="1">
+                <a:schemeClr val="accent1"/>
+              </a:lnRef>
+              <a:fillRef idx="0">
+                <a:schemeClr val="accent1"/>
+              </a:fillRef>
+              <a:effectRef idx="0">
+                <a:schemeClr val="accent1"/>
+              </a:effectRef>
+              <a:fontRef idx="minor">
+                <a:schemeClr val="tx1"/>
+              </a:fontRef>
+            </p:style>
+          </p:cxnSp>
+          <p:sp>
+            <p:nvSpPr>
+              <p:cNvPr id="20" name="TextBox 19">
+                <a:extLst>
+                  <a:ext uri="{FF2B5EF4-FFF2-40B4-BE49-F238E27FC236}">
+                    <a16:creationId xmlns:a16="http://schemas.microsoft.com/office/drawing/2014/main" id="{F557775F-E6FF-19EE-F19D-0A5CBC6591AD}"/>
+                  </a:ext>
+                </a:extLst>
+              </p:cNvPr>
+              <p:cNvSpPr txBox="1"/>
+              <p:nvPr/>
+            </p:nvSpPr>
+            <p:spPr>
+              <a:xfrm>
+                <a:off x="2745843" y="3551348"/>
+                <a:ext cx="2388417" cy="451405"/>
+              </a:xfrm>
+              <a:prstGeom prst="rect">
+                <a:avLst/>
+              </a:prstGeom>
+              <a:noFill/>
+              <a:ln>
+                <a:noFill/>
+              </a:ln>
+            </p:spPr>
+            <p:txBody>
+              <a:bodyPr wrap="square" rtlCol="0">
+                <a:spAutoFit/>
+              </a:bodyPr>
+              <a:lstStyle>
+                <a:defPPr>
+                  <a:defRPr lang="en-AU"/>
+                </a:defPPr>
+                <a:lvl1pPr algn="ctr">
+                  <a:defRPr sz="1800">
+                    <a:solidFill>
+                      <a:srgbClr val="C59C52"/>
+                    </a:solidFill>
+                    <a:latin typeface="Roboto" panose="02000000000000000000" pitchFamily="2" charset="0"/>
+                    <a:ea typeface="Roboto" panose="02000000000000000000" pitchFamily="2" charset="0"/>
+                  </a:defRPr>
+                </a:lvl1pPr>
+              </a:lstStyle>
+              <a:p>
+                <a:r>
+                  <a:rPr lang="en-US" sz="1600" dirty="0" err="1"/>
+                  <a:t>ppcall</a:t>
+                </a:r>
+                <a:r>
+                  <a:rPr lang="en-US" sz="1600" dirty="0"/>
+                  <a:t>(…)</a:t>
+                </a:r>
+              </a:p>
+            </p:txBody>
+          </p:sp>
+          <p:sp>
+            <p:nvSpPr>
+              <p:cNvPr id="9" name="TextBox 8">
+                <a:extLst>
+                  <a:ext uri="{FF2B5EF4-FFF2-40B4-BE49-F238E27FC236}">
+                    <a16:creationId xmlns:a16="http://schemas.microsoft.com/office/drawing/2014/main" id="{F85D0EC0-BF51-A0FA-12AC-5472F08685FF}"/>
+                  </a:ext>
+                </a:extLst>
+              </p:cNvPr>
+              <p:cNvSpPr txBox="1"/>
+              <p:nvPr/>
+            </p:nvSpPr>
+            <p:spPr>
+              <a:xfrm>
+                <a:off x="2665435" y="2919536"/>
+                <a:ext cx="2468825" cy="451405"/>
+              </a:xfrm>
+              <a:prstGeom prst="rect">
+                <a:avLst/>
+              </a:prstGeom>
+              <a:noFill/>
+              <a:ln>
+                <a:noFill/>
+              </a:ln>
+            </p:spPr>
+            <p:txBody>
+              <a:bodyPr wrap="square" rtlCol="0">
+                <a:spAutoFit/>
+              </a:bodyPr>
+              <a:lstStyle>
+                <a:defPPr>
+                  <a:defRPr lang="en-AU"/>
+                </a:defPPr>
+                <a:lvl1pPr algn="ctr">
+                  <a:defRPr sz="1800">
+                    <a:solidFill>
+                      <a:srgbClr val="C59C52"/>
+                    </a:solidFill>
+                    <a:latin typeface="Roboto" panose="02000000000000000000" pitchFamily="2" charset="0"/>
+                    <a:ea typeface="Roboto" panose="02000000000000000000" pitchFamily="2" charset="0"/>
+                  </a:defRPr>
+                </a:lvl1pPr>
+              </a:lstStyle>
+              <a:p>
+                <a:r>
+                  <a:rPr lang="en-US" sz="1600" dirty="0"/>
+                  <a:t>notify(…)</a:t>
+                </a:r>
+              </a:p>
+            </p:txBody>
+          </p:sp>
+        </p:grpSp>
+        <p:grpSp>
+          <p:nvGrpSpPr>
+            <p:cNvPr id="3" name="Group 2">
+              <a:extLst>
+                <a:ext uri="{FF2B5EF4-FFF2-40B4-BE49-F238E27FC236}">
+                  <a16:creationId xmlns:a16="http://schemas.microsoft.com/office/drawing/2014/main" id="{6CC3C5ED-CAC9-7D4C-790C-E30AA9CD6CC5}"/>
+                </a:ext>
+              </a:extLst>
+            </p:cNvPr>
+            <p:cNvGrpSpPr/>
+            <p:nvPr/>
+          </p:nvGrpSpPr>
+          <p:grpSpPr>
+            <a:xfrm>
+              <a:off x="5808776" y="1563638"/>
+              <a:ext cx="1499528" cy="2009851"/>
+              <a:chOff x="5808776" y="1563638"/>
+              <a:chExt cx="1499528" cy="2009851"/>
+            </a:xfrm>
+          </p:grpSpPr>
+          <p:sp>
+            <p:nvSpPr>
+              <p:cNvPr id="4" name="Rectangle 3">
+                <a:extLst>
+                  <a:ext uri="{FF2B5EF4-FFF2-40B4-BE49-F238E27FC236}">
+                    <a16:creationId xmlns:a16="http://schemas.microsoft.com/office/drawing/2014/main" id="{215AA153-06F5-E17C-5F59-25A2741421A6}"/>
+                  </a:ext>
+                </a:extLst>
+              </p:cNvPr>
+              <p:cNvSpPr/>
+              <p:nvPr/>
+            </p:nvSpPr>
+            <p:spPr>
+              <a:xfrm>
+                <a:off x="5808776" y="1563638"/>
+                <a:ext cx="1499528" cy="2009851"/>
+              </a:xfrm>
+              <a:prstGeom prst="rect">
+                <a:avLst/>
+              </a:prstGeom>
+              <a:solidFill>
+                <a:srgbClr val="DEE3EA"/>
+              </a:solidFill>
+              <a:ln>
+                <a:noFill/>
+              </a:ln>
+            </p:spPr>
+            <p:style>
+              <a:lnRef idx="2">
+                <a:schemeClr val="accent1">
+                  <a:shade val="50000"/>
+                </a:schemeClr>
+              </a:lnRef>
+              <a:fillRef idx="1">
+                <a:schemeClr val="accent1"/>
+              </a:fillRef>
+              <a:effectRef idx="0">
+                <a:schemeClr val="accent1"/>
+              </a:effectRef>
+              <a:fontRef idx="minor">
+                <a:schemeClr val="lt1"/>
+              </a:fontRef>
+            </p:style>
+            <p:txBody>
+              <a:bodyPr rtlCol="0" anchor="t"/>
+              <a:lstStyle/>
+              <a:p>
+                <a:pPr algn="ctr"/>
+                <a:r>
+                  <a:rPr lang="en-AU" dirty="0">
+                    <a:solidFill>
+                      <a:schemeClr val="tx1"/>
+                    </a:solidFill>
+                    <a:latin typeface="Roboto" panose="02000000000000000000" pitchFamily="2" charset="0"/>
+                    <a:ea typeface="Roboto" panose="02000000000000000000" pitchFamily="2" charset="0"/>
+                  </a:rPr>
+                  <a:t>Protection Domain 2</a:t>
+                </a:r>
+              </a:p>
+            </p:txBody>
+          </p:sp>
+          <p:sp>
+            <p:nvSpPr>
+              <p:cNvPr id="7" name="TextBox 6">
+                <a:extLst>
+                  <a:ext uri="{FF2B5EF4-FFF2-40B4-BE49-F238E27FC236}">
+                    <a16:creationId xmlns:a16="http://schemas.microsoft.com/office/drawing/2014/main" id="{FB0B546B-9501-17CD-7389-FDD5FAD18CD9}"/>
+                  </a:ext>
+                </a:extLst>
+              </p:cNvPr>
+              <p:cNvSpPr txBox="1"/>
+              <p:nvPr/>
+            </p:nvSpPr>
+            <p:spPr>
+              <a:xfrm>
+                <a:off x="6410545" y="2213575"/>
+                <a:ext cx="897759" cy="338554"/>
+              </a:xfrm>
+              <a:prstGeom prst="rect">
+                <a:avLst/>
+              </a:prstGeom>
+              <a:solidFill>
+                <a:srgbClr val="47678B"/>
+              </a:solidFill>
+            </p:spPr>
+            <p:txBody>
+              <a:bodyPr wrap="square" rtlCol="0" anchor="ctr">
+                <a:spAutoFit/>
+              </a:bodyPr>
+              <a:lstStyle/>
+              <a:p>
+                <a:pPr algn="ctr"/>
+                <a:r>
+                  <a:rPr lang="en-US" sz="1600" dirty="0" err="1">
+                    <a:solidFill>
+                      <a:schemeClr val="bg1"/>
+                    </a:solidFill>
+                    <a:latin typeface="Roboto" panose="02000000000000000000" pitchFamily="2" charset="0"/>
+                    <a:ea typeface="Roboto" panose="02000000000000000000" pitchFamily="2" charset="0"/>
+                  </a:rPr>
+                  <a:t>init</a:t>
+                </a:r>
+                <a:r>
+                  <a:rPr lang="en-US" sz="1600" dirty="0">
+                    <a:solidFill>
+                      <a:schemeClr val="bg1"/>
+                    </a:solidFill>
+                    <a:latin typeface="Roboto" panose="02000000000000000000" pitchFamily="2" charset="0"/>
+                    <a:ea typeface="Roboto" panose="02000000000000000000" pitchFamily="2" charset="0"/>
+                  </a:rPr>
+                  <a:t>(…)</a:t>
+                </a:r>
+              </a:p>
+            </p:txBody>
+          </p:sp>
+          <p:sp>
+            <p:nvSpPr>
+              <p:cNvPr id="8" name="TextBox 7">
+                <a:extLst>
+                  <a:ext uri="{FF2B5EF4-FFF2-40B4-BE49-F238E27FC236}">
+                    <a16:creationId xmlns:a16="http://schemas.microsoft.com/office/drawing/2014/main" id="{FE9352EE-8342-602F-B18D-716D45C1FB04}"/>
+                  </a:ext>
+                </a:extLst>
+              </p:cNvPr>
+              <p:cNvSpPr txBox="1"/>
+              <p:nvPr/>
+            </p:nvSpPr>
+            <p:spPr>
+              <a:xfrm>
+                <a:off x="5821705" y="2683113"/>
+                <a:ext cx="1355577" cy="338554"/>
+              </a:xfrm>
+              <a:prstGeom prst="rect">
+                <a:avLst/>
+              </a:prstGeom>
+              <a:solidFill>
+                <a:srgbClr val="47678B"/>
+              </a:solidFill>
+            </p:spPr>
+            <p:txBody>
+              <a:bodyPr wrap="square" rtlCol="0" anchor="ctr">
+                <a:spAutoFit/>
+              </a:bodyPr>
+              <a:lstStyle/>
+              <a:p>
+                <a:r>
+                  <a:rPr lang="en-US" sz="1600" dirty="0">
+                    <a:solidFill>
+                      <a:schemeClr val="bg1"/>
+                    </a:solidFill>
+                    <a:latin typeface="Roboto" panose="02000000000000000000" pitchFamily="2" charset="0"/>
+                    <a:ea typeface="Roboto" panose="02000000000000000000" pitchFamily="2" charset="0"/>
+                  </a:rPr>
+                  <a:t>notified(…)</a:t>
+                </a:r>
+              </a:p>
+            </p:txBody>
+          </p:sp>
+        </p:grpSp>
+      </p:grpSp>
+      <p:sp>
+        <p:nvSpPr>
+          <p:cNvPr id="13" name="Title 12">
+            <a:extLst>
+              <a:ext uri="{FF2B5EF4-FFF2-40B4-BE49-F238E27FC236}">
+                <a16:creationId xmlns:a16="http://schemas.microsoft.com/office/drawing/2014/main" id="{67B96749-5B47-A02F-CC9C-8CFAD20B4887}"/>
+              </a:ext>
+            </a:extLst>
+          </p:cNvPr>
+          <p:cNvSpPr>
+            <a:spLocks noGrp="1"/>
+          </p:cNvSpPr>
+          <p:nvPr>
+            <p:ph type="title"/>
+          </p:nvPr>
+        </p:nvSpPr>
+        <p:spPr/>
+        <p:txBody>
+          <a:bodyPr>
+            <a:normAutofit/>
+          </a:bodyPr>
+          <a:lstStyle/>
+          <a:p>
+            <a:r>
+              <a:rPr lang="en-AU" dirty="0" err="1"/>
+              <a:t>microkit</a:t>
+            </a:r>
+            <a:endParaRPr lang="en-AU" dirty="0"/>
+          </a:p>
+        </p:txBody>
+      </p:sp>
+      <p:sp>
+        <p:nvSpPr>
+          <p:cNvPr id="26" name="Slide Number Placeholder 25">
+            <a:extLst>
+              <a:ext uri="{FF2B5EF4-FFF2-40B4-BE49-F238E27FC236}">
+                <a16:creationId xmlns:a16="http://schemas.microsoft.com/office/drawing/2014/main" id="{BF111941-CA62-813D-3814-57E2563A607C}"/>
+              </a:ext>
+            </a:extLst>
+          </p:cNvPr>
+          <p:cNvSpPr>
+            <a:spLocks noGrp="1"/>
+          </p:cNvSpPr>
+          <p:nvPr>
+            <p:ph type="sldNum" sz="quarter" idx="12"/>
+          </p:nvPr>
+        </p:nvSpPr>
+        <p:spPr/>
+        <p:txBody>
+          <a:bodyPr/>
+          <a:lstStyle/>
+          <a:p>
+            <a:fld id="{89270BD9-3C0A-4B9B-8265-856CEF1C8945}" type="slidenum">
+              <a:rPr lang="en-AU" smtClean="0"/>
+              <a:pPr/>
+              <a:t>6</a:t>
+            </a:fld>
+            <a:endParaRPr lang="en-AU"/>
+          </a:p>
+        </p:txBody>
+      </p:sp>
+    </p:spTree>
+    <p:extLst>
+      <p:ext uri="{BB962C8B-B14F-4D97-AF65-F5344CB8AC3E}">
+        <p14:creationId xmlns:p14="http://schemas.microsoft.com/office/powerpoint/2010/main" val="2725321623"/>
+      </p:ext>
+    </p:extLst>
+  </p:cSld>
+  <p:clrMapOvr>
+    <a:masterClrMapping/>
+  </p:clrMapOvr>
+</p:sld>
+</file>
+
+<file path=ppt/slides/slide8.xml><?xml version="1.0" encoding="utf-8"?>
+<p:sld xmlns:a="http://schemas.openxmlformats.org/drawingml/2006/main" xmlns:r="http://schemas.openxmlformats.org/officeDocument/2006/relationships" xmlns:p="http://schemas.openxmlformats.org/presentationml/2006/main">
+  <p:cSld>
+    <p:spTree>
+      <p:nvGrpSpPr>
+        <p:cNvPr id="1" name=""/>
+        <p:cNvGrpSpPr/>
+        <p:nvPr/>
+      </p:nvGrpSpPr>
+      <p:grpSpPr>
+        <a:xfrm>
+          <a:off x="0" y="0"/>
+          <a:ext cx="0" cy="0"/>
+          <a:chOff x="0" y="0"/>
+          <a:chExt cx="0" cy="0"/>
+        </a:xfrm>
+      </p:grpSpPr>
+      <p:grpSp>
+        <p:nvGrpSpPr>
           <p:cNvPr id="28" name="Group 27">
             <a:extLst>
               <a:ext uri="{FF2B5EF4-FFF2-40B4-BE49-F238E27FC236}">
@@ -28210,7 +29684,7 @@
 </p:sld>
 </file>
 
-<file path=ppt/slides/slide8.xml><?xml version="1.0" encoding="utf-8"?>
+<file path=ppt/slides/slide9.xml><?xml version="1.0" encoding="utf-8"?>
 <p:sld xmlns:a="http://schemas.openxmlformats.org/drawingml/2006/main" xmlns:r="http://schemas.openxmlformats.org/officeDocument/2006/relationships" xmlns:p="http://schemas.openxmlformats.org/presentationml/2006/main">
   <p:cSld>
     <p:spTree>
@@ -34541,555 +36015,6 @@
 </p:sld>
 </file>
 
-<file path=ppt/slides/slide9.xml><?xml version="1.0" encoding="utf-8"?>
-<p:sld xmlns:a="http://schemas.openxmlformats.org/drawingml/2006/main" xmlns:r="http://schemas.openxmlformats.org/officeDocument/2006/relationships" xmlns:p="http://schemas.openxmlformats.org/presentationml/2006/main">
-  <p:cSld>
-    <p:spTree>
-      <p:nvGrpSpPr>
-        <p:cNvPr id="1" name=""/>
-        <p:cNvGrpSpPr/>
-        <p:nvPr/>
-      </p:nvGrpSpPr>
-      <p:grpSpPr>
-        <a:xfrm>
-          <a:off x="0" y="0"/>
-          <a:ext cx="0" cy="0"/>
-          <a:chOff x="0" y="0"/>
-          <a:chExt cx="0" cy="0"/>
-        </a:xfrm>
-      </p:grpSpPr>
-      <p:grpSp>
-        <p:nvGrpSpPr>
-          <p:cNvPr id="11" name="Group 10">
-            <a:extLst>
-              <a:ext uri="{FF2B5EF4-FFF2-40B4-BE49-F238E27FC236}">
-                <a16:creationId xmlns:a16="http://schemas.microsoft.com/office/drawing/2014/main" id="{D43D4A74-F798-8340-B3DE-C76D52963803}"/>
-              </a:ext>
-            </a:extLst>
-          </p:cNvPr>
-          <p:cNvGrpSpPr/>
-          <p:nvPr/>
-        </p:nvGrpSpPr>
-        <p:grpSpPr>
-          <a:xfrm>
-            <a:off x="1109376" y="2675744"/>
-            <a:ext cx="4279743" cy="1372339"/>
-            <a:chOff x="1109375" y="1818493"/>
-            <a:chExt cx="4279743" cy="1372339"/>
-          </a:xfrm>
-        </p:grpSpPr>
-        <p:pic>
-          <p:nvPicPr>
-            <p:cNvPr id="2" name="Picture 1" descr="key.png">
-              <a:extLst>
-                <a:ext uri="{FF2B5EF4-FFF2-40B4-BE49-F238E27FC236}">
-                  <a16:creationId xmlns:a16="http://schemas.microsoft.com/office/drawing/2014/main" id="{25C1C504-AACD-9147-BC1D-7C6DD1D11B24}"/>
-                </a:ext>
-              </a:extLst>
-            </p:cNvPr>
-            <p:cNvPicPr>
-              <a:picLocks noChangeAspect="1"/>
-            </p:cNvPicPr>
-            <p:nvPr/>
-          </p:nvPicPr>
-          <p:blipFill>
-            <a:blip r:embed="rId2"/>
-            <a:stretch>
-              <a:fillRect/>
-            </a:stretch>
-          </p:blipFill>
-          <p:spPr>
-            <a:xfrm>
-              <a:off x="1187624" y="1922158"/>
-              <a:ext cx="1276828" cy="542652"/>
-            </a:xfrm>
-            <a:prstGeom prst="rect">
-              <a:avLst/>
-            </a:prstGeom>
-          </p:spPr>
-        </p:pic>
-        <p:grpSp>
-          <p:nvGrpSpPr>
-            <p:cNvPr id="3" name="Group 9">
-              <a:extLst>
-                <a:ext uri="{FF2B5EF4-FFF2-40B4-BE49-F238E27FC236}">
-                  <a16:creationId xmlns:a16="http://schemas.microsoft.com/office/drawing/2014/main" id="{654F8256-AC12-6F46-ACBB-8AB5AB54CAFA}"/>
-                </a:ext>
-              </a:extLst>
-            </p:cNvPr>
-            <p:cNvGrpSpPr/>
-            <p:nvPr/>
-          </p:nvGrpSpPr>
-          <p:grpSpPr>
-            <a:xfrm>
-              <a:off x="1109375" y="2513993"/>
-              <a:ext cx="1588854" cy="676839"/>
-              <a:chOff x="2760713" y="3657600"/>
-              <a:chExt cx="1191640" cy="507630"/>
-            </a:xfrm>
-          </p:grpSpPr>
-          <p:sp>
-            <p:nvSpPr>
-              <p:cNvPr id="4" name="TextBox 3">
-                <a:extLst>
-                  <a:ext uri="{FF2B5EF4-FFF2-40B4-BE49-F238E27FC236}">
-                    <a16:creationId xmlns:a16="http://schemas.microsoft.com/office/drawing/2014/main" id="{61843C73-3B87-4E44-B871-7FC92E397726}"/>
-                  </a:ext>
-                </a:extLst>
-              </p:cNvPr>
-              <p:cNvSpPr txBox="1"/>
-              <p:nvPr/>
-            </p:nvSpPr>
-            <p:spPr>
-              <a:xfrm>
-                <a:off x="2760713" y="3657600"/>
-                <a:ext cx="1191639" cy="253916"/>
-              </a:xfrm>
-              <a:prstGeom prst="rect">
-                <a:avLst/>
-              </a:prstGeom>
-              <a:solidFill>
-                <a:srgbClr val="9AA8BC"/>
-              </a:solidFill>
-              <a:ln>
-                <a:noFill/>
-              </a:ln>
-            </p:spPr>
-            <p:style>
-              <a:lnRef idx="2">
-                <a:schemeClr val="accent1">
-                  <a:shade val="50000"/>
-                </a:schemeClr>
-              </a:lnRef>
-              <a:fillRef idx="1">
-                <a:schemeClr val="accent1"/>
-              </a:fillRef>
-              <a:effectRef idx="0">
-                <a:schemeClr val="accent1"/>
-              </a:effectRef>
-              <a:fontRef idx="minor">
-                <a:schemeClr val="lt1"/>
-              </a:fontRef>
-            </p:style>
-            <p:txBody>
-              <a:bodyPr rtlCol="0" anchor="ctr"/>
-              <a:lstStyle>
-                <a:defPPr>
-                  <a:defRPr lang="en-US"/>
-                </a:defPPr>
-                <a:lvl1pPr algn="ctr">
-                  <a:defRPr>
-                    <a:solidFill>
-                      <a:schemeClr val="tx1"/>
-                    </a:solidFill>
-                    <a:latin typeface="Arial" panose="020B0604020202020204" pitchFamily="34" charset="0"/>
-                    <a:cs typeface="Arial" panose="020B0604020202020204" pitchFamily="34" charset="0"/>
-                  </a:defRPr>
-                </a:lvl1pPr>
-                <a:lvl2pPr>
-                  <a:defRPr>
-                    <a:solidFill>
-                      <a:schemeClr val="lt1"/>
-                    </a:solidFill>
-                  </a:defRPr>
-                </a:lvl2pPr>
-                <a:lvl3pPr>
-                  <a:defRPr>
-                    <a:solidFill>
-                      <a:schemeClr val="lt1"/>
-                    </a:solidFill>
-                  </a:defRPr>
-                </a:lvl3pPr>
-                <a:lvl4pPr>
-                  <a:defRPr>
-                    <a:solidFill>
-                      <a:schemeClr val="lt1"/>
-                    </a:solidFill>
-                  </a:defRPr>
-                </a:lvl4pPr>
-                <a:lvl5pPr>
-                  <a:defRPr>
-                    <a:solidFill>
-                      <a:schemeClr val="lt1"/>
-                    </a:solidFill>
-                  </a:defRPr>
-                </a:lvl5pPr>
-                <a:lvl6pPr>
-                  <a:defRPr>
-                    <a:solidFill>
-                      <a:schemeClr val="lt1"/>
-                    </a:solidFill>
-                  </a:defRPr>
-                </a:lvl6pPr>
-                <a:lvl7pPr>
-                  <a:defRPr>
-                    <a:solidFill>
-                      <a:schemeClr val="lt1"/>
-                    </a:solidFill>
-                  </a:defRPr>
-                </a:lvl7pPr>
-                <a:lvl8pPr>
-                  <a:defRPr>
-                    <a:solidFill>
-                      <a:schemeClr val="lt1"/>
-                    </a:solidFill>
-                  </a:defRPr>
-                </a:lvl8pPr>
-                <a:lvl9pPr>
-                  <a:defRPr>
-                    <a:solidFill>
-                      <a:schemeClr val="lt1"/>
-                    </a:solidFill>
-                  </a:defRPr>
-                </a:lvl9pPr>
-              </a:lstStyle>
-              <a:p>
-                <a:r>
-                  <a:rPr lang="en-AU" dirty="0">
-                    <a:latin typeface="Roboto" panose="02000000000000000000" pitchFamily="2" charset="0"/>
-                    <a:ea typeface="Roboto" panose="02000000000000000000" pitchFamily="2" charset="0"/>
-                  </a:rPr>
-                  <a:t>Obj reference</a:t>
-                </a:r>
-              </a:p>
-            </p:txBody>
-          </p:sp>
-          <p:sp>
-            <p:nvSpPr>
-              <p:cNvPr id="5" name="TextBox 4">
-                <a:extLst>
-                  <a:ext uri="{FF2B5EF4-FFF2-40B4-BE49-F238E27FC236}">
-                    <a16:creationId xmlns:a16="http://schemas.microsoft.com/office/drawing/2014/main" id="{84CD4ECC-2606-9745-A884-EF8CA54A50F8}"/>
-                  </a:ext>
-                </a:extLst>
-              </p:cNvPr>
-              <p:cNvSpPr txBox="1"/>
-              <p:nvPr/>
-            </p:nvSpPr>
-            <p:spPr>
-              <a:xfrm>
-                <a:off x="2760714" y="3911415"/>
-                <a:ext cx="1191639" cy="253815"/>
-              </a:xfrm>
-              <a:prstGeom prst="rect">
-                <a:avLst/>
-              </a:prstGeom>
-              <a:solidFill>
-                <a:srgbClr val="C59C52"/>
-              </a:solidFill>
-              <a:ln>
-                <a:noFill/>
-              </a:ln>
-            </p:spPr>
-            <p:style>
-              <a:lnRef idx="2">
-                <a:schemeClr val="accent1">
-                  <a:shade val="50000"/>
-                </a:schemeClr>
-              </a:lnRef>
-              <a:fillRef idx="1">
-                <a:schemeClr val="accent1"/>
-              </a:fillRef>
-              <a:effectRef idx="0">
-                <a:schemeClr val="accent1"/>
-              </a:effectRef>
-              <a:fontRef idx="minor">
-                <a:schemeClr val="lt1"/>
-              </a:fontRef>
-            </p:style>
-            <p:txBody>
-              <a:bodyPr rtlCol="0" anchor="ctr"/>
-              <a:lstStyle>
-                <a:defPPr>
-                  <a:defRPr lang="en-US"/>
-                </a:defPPr>
-                <a:lvl1pPr algn="ctr">
-                  <a:defRPr>
-                    <a:solidFill>
-                      <a:schemeClr val="bg1"/>
-                    </a:solidFill>
-                    <a:latin typeface="Arial" panose="020B0604020202020204" pitchFamily="34" charset="0"/>
-                    <a:cs typeface="Arial" panose="020B0604020202020204" pitchFamily="34" charset="0"/>
-                  </a:defRPr>
-                </a:lvl1pPr>
-                <a:lvl2pPr>
-                  <a:defRPr>
-                    <a:solidFill>
-                      <a:schemeClr val="lt1"/>
-                    </a:solidFill>
-                  </a:defRPr>
-                </a:lvl2pPr>
-                <a:lvl3pPr>
-                  <a:defRPr>
-                    <a:solidFill>
-                      <a:schemeClr val="lt1"/>
-                    </a:solidFill>
-                  </a:defRPr>
-                </a:lvl3pPr>
-                <a:lvl4pPr>
-                  <a:defRPr>
-                    <a:solidFill>
-                      <a:schemeClr val="lt1"/>
-                    </a:solidFill>
-                  </a:defRPr>
-                </a:lvl4pPr>
-                <a:lvl5pPr>
-                  <a:defRPr>
-                    <a:solidFill>
-                      <a:schemeClr val="lt1"/>
-                    </a:solidFill>
-                  </a:defRPr>
-                </a:lvl5pPr>
-                <a:lvl6pPr>
-                  <a:defRPr>
-                    <a:solidFill>
-                      <a:schemeClr val="lt1"/>
-                    </a:solidFill>
-                  </a:defRPr>
-                </a:lvl6pPr>
-                <a:lvl7pPr>
-                  <a:defRPr>
-                    <a:solidFill>
-                      <a:schemeClr val="lt1"/>
-                    </a:solidFill>
-                  </a:defRPr>
-                </a:lvl7pPr>
-                <a:lvl8pPr>
-                  <a:defRPr>
-                    <a:solidFill>
-                      <a:schemeClr val="lt1"/>
-                    </a:solidFill>
-                  </a:defRPr>
-                </a:lvl8pPr>
-                <a:lvl9pPr>
-                  <a:defRPr>
-                    <a:solidFill>
-                      <a:schemeClr val="lt1"/>
-                    </a:solidFill>
-                  </a:defRPr>
-                </a:lvl9pPr>
-              </a:lstStyle>
-              <a:p>
-                <a:r>
-                  <a:rPr lang="en-AU" dirty="0">
-                    <a:latin typeface="Roboto" panose="02000000000000000000" pitchFamily="2" charset="0"/>
-                    <a:ea typeface="Roboto" panose="02000000000000000000" pitchFamily="2" charset="0"/>
-                  </a:rPr>
-                  <a:t>Access rights</a:t>
-                </a:r>
-              </a:p>
-            </p:txBody>
-          </p:sp>
-        </p:grpSp>
-        <p:grpSp>
-          <p:nvGrpSpPr>
-            <p:cNvPr id="8" name="Group 19">
-              <a:extLst>
-                <a:ext uri="{FF2B5EF4-FFF2-40B4-BE49-F238E27FC236}">
-                  <a16:creationId xmlns:a16="http://schemas.microsoft.com/office/drawing/2014/main" id="{DE4BB33B-9B66-2545-9206-22918F4D8580}"/>
-                </a:ext>
-              </a:extLst>
-            </p:cNvPr>
-            <p:cNvGrpSpPr/>
-            <p:nvPr/>
-          </p:nvGrpSpPr>
-          <p:grpSpPr>
-            <a:xfrm>
-              <a:off x="3635896" y="1818493"/>
-              <a:ext cx="1753222" cy="1113297"/>
-              <a:chOff x="4343401" y="2227091"/>
-              <a:chExt cx="1314917" cy="834973"/>
-            </a:xfrm>
-          </p:grpSpPr>
-          <p:sp>
-            <p:nvSpPr>
-              <p:cNvPr id="9" name="Rectangle 8">
-                <a:extLst>
-                  <a:ext uri="{FF2B5EF4-FFF2-40B4-BE49-F238E27FC236}">
-                    <a16:creationId xmlns:a16="http://schemas.microsoft.com/office/drawing/2014/main" id="{87320FE3-E341-A147-B4E7-72895AC53BC6}"/>
-                  </a:ext>
-                </a:extLst>
-              </p:cNvPr>
-              <p:cNvSpPr/>
-              <p:nvPr/>
-            </p:nvSpPr>
-            <p:spPr>
-              <a:xfrm>
-                <a:off x="4343401" y="2227091"/>
-                <a:ext cx="1314917" cy="834973"/>
-              </a:xfrm>
-              <a:prstGeom prst="rect">
-                <a:avLst/>
-              </a:prstGeom>
-              <a:solidFill>
-                <a:srgbClr val="9AA8BC"/>
-              </a:solidFill>
-              <a:ln>
-                <a:noFill/>
-              </a:ln>
-            </p:spPr>
-            <p:style>
-              <a:lnRef idx="2">
-                <a:schemeClr val="accent1">
-                  <a:shade val="50000"/>
-                </a:schemeClr>
-              </a:lnRef>
-              <a:fillRef idx="1">
-                <a:schemeClr val="accent1"/>
-              </a:fillRef>
-              <a:effectRef idx="0">
-                <a:schemeClr val="accent1"/>
-              </a:effectRef>
-              <a:fontRef idx="minor">
-                <a:schemeClr val="lt1"/>
-              </a:fontRef>
-            </p:style>
-            <p:txBody>
-              <a:bodyPr rtlCol="0" anchor="ctr"/>
-              <a:lstStyle/>
-              <a:p>
-                <a:pPr algn="r"/>
-                <a:r>
-                  <a:rPr lang="en-AU" dirty="0">
-                    <a:solidFill>
-                      <a:schemeClr val="tx1"/>
-                    </a:solidFill>
-                    <a:latin typeface="Roboto" panose="02000000000000000000" pitchFamily="2" charset="0"/>
-                    <a:ea typeface="Roboto" panose="02000000000000000000" pitchFamily="2" charset="0"/>
-                    <a:cs typeface="Arial" panose="020B0604020202020204" pitchFamily="34" charset="0"/>
-                  </a:rPr>
-                  <a:t>Object</a:t>
-                </a:r>
-              </a:p>
-            </p:txBody>
-          </p:sp>
-          <p:pic>
-            <p:nvPicPr>
-              <p:cNvPr id="10" name="Picture 9" descr="lock-l.png">
-                <a:extLst>
-                  <a:ext uri="{FF2B5EF4-FFF2-40B4-BE49-F238E27FC236}">
-                    <a16:creationId xmlns:a16="http://schemas.microsoft.com/office/drawing/2014/main" id="{94874EDF-1484-6A48-A5B2-C97E5A743482}"/>
-                  </a:ext>
-                </a:extLst>
-              </p:cNvPr>
-              <p:cNvPicPr>
-                <a:picLocks noChangeAspect="1"/>
-              </p:cNvPicPr>
-              <p:nvPr/>
-            </p:nvPicPr>
-            <p:blipFill>
-              <a:blip r:embed="rId3"/>
-              <a:stretch>
-                <a:fillRect/>
-              </a:stretch>
-            </p:blipFill>
-            <p:spPr>
-              <a:xfrm>
-                <a:off x="4432641" y="2317058"/>
-                <a:ext cx="504825" cy="609600"/>
-              </a:xfrm>
-              <a:prstGeom prst="rect">
-                <a:avLst/>
-              </a:prstGeom>
-            </p:spPr>
-          </p:pic>
-        </p:grpSp>
-        <p:cxnSp>
-          <p:nvCxnSpPr>
-            <p:cNvPr id="7" name="Straight Arrow Connector 6">
-              <a:extLst>
-                <a:ext uri="{FF2B5EF4-FFF2-40B4-BE49-F238E27FC236}">
-                  <a16:creationId xmlns:a16="http://schemas.microsoft.com/office/drawing/2014/main" id="{2B66F578-FA9D-6B47-9CE9-3E30732D390A}"/>
-                </a:ext>
-              </a:extLst>
-            </p:cNvPr>
-            <p:cNvCxnSpPr>
-              <a:cxnSpLocks/>
-              <a:stCxn id="4" idx="3"/>
-              <a:endCxn id="10" idx="1"/>
-            </p:cNvCxnSpPr>
-            <p:nvPr/>
-          </p:nvCxnSpPr>
-          <p:spPr>
-            <a:xfrm flipV="1">
-              <a:off x="2698228" y="2344849"/>
-              <a:ext cx="1056655" cy="338420"/>
-            </a:xfrm>
-            <a:prstGeom prst="straightConnector1">
-              <a:avLst/>
-            </a:prstGeom>
-            <a:ln w="57150" cap="flat" cmpd="sng" algn="ctr">
-              <a:solidFill>
-                <a:schemeClr val="accent4"/>
-              </a:solidFill>
-              <a:prstDash val="solid"/>
-              <a:round/>
-              <a:headEnd type="none" w="med" len="med"/>
-              <a:tailEnd type="arrow" w="med" len="med"/>
-            </a:ln>
-          </p:spPr>
-          <p:style>
-            <a:lnRef idx="2">
-              <a:schemeClr val="accent1"/>
-            </a:lnRef>
-            <a:fillRef idx="0">
-              <a:schemeClr val="accent1"/>
-            </a:fillRef>
-            <a:effectRef idx="1">
-              <a:schemeClr val="accent1"/>
-            </a:effectRef>
-            <a:fontRef idx="minor">
-              <a:schemeClr val="tx1"/>
-            </a:fontRef>
-          </p:style>
-        </p:cxnSp>
-      </p:grpSp>
-      <p:sp>
-        <p:nvSpPr>
-          <p:cNvPr id="6" name="Title 5">
-            <a:extLst>
-              <a:ext uri="{FF2B5EF4-FFF2-40B4-BE49-F238E27FC236}">
-                <a16:creationId xmlns:a16="http://schemas.microsoft.com/office/drawing/2014/main" id="{F9BFCFCF-B6E9-D342-B347-225B443F5FC1}"/>
-              </a:ext>
-            </a:extLst>
-          </p:cNvPr>
-          <p:cNvSpPr>
-            <a:spLocks noGrp="1"/>
-          </p:cNvSpPr>
-          <p:nvPr>
-            <p:ph type="title"/>
-          </p:nvPr>
-        </p:nvSpPr>
-        <p:spPr/>
-        <p:txBody>
-          <a:bodyPr>
-            <a:normAutofit/>
-          </a:bodyPr>
-          <a:lstStyle/>
-          <a:p>
-            <a:r>
-              <a:rPr lang="en-AU" dirty="0">
-                <a:latin typeface="Roboto" panose="02000000000000000000" pitchFamily="2" charset="0"/>
-                <a:ea typeface="Roboto" panose="02000000000000000000" pitchFamily="2" charset="0"/>
-              </a:rPr>
-              <a:t>cap</a:t>
-            </a:r>
-          </a:p>
-        </p:txBody>
-      </p:sp>
-    </p:spTree>
-    <p:extLst>
-      <p:ext uri="{BB962C8B-B14F-4D97-AF65-F5344CB8AC3E}">
-        <p14:creationId xmlns:p14="http://schemas.microsoft.com/office/powerpoint/2010/main" val="3624242860"/>
-      </p:ext>
-    </p:extLst>
-  </p:cSld>
-  <p:clrMapOvr>
-    <a:masterClrMapping/>
-  </p:clrMapOvr>
-</p:sld>
-</file>
-
 <file path=ppt/theme/theme1.xml><?xml version="1.0" encoding="utf-8"?>
 <a:theme xmlns:a="http://schemas.openxmlformats.org/drawingml/2006/main" name="Retrospect">
   <a:themeElements>

</xml_diff>

<commit_message>
Replaced CAmkES section by ukit, plus minor edits
Signed-off-by: Gernot Heiser <gernot@unsw.edu.au>
</commit_message>
<xml_diff>
--- a/imgs/figs.pptx
+++ b/imgs/figs.pptx
@@ -29740,10 +29740,10 @@
       </p:sp>
       <p:grpSp>
         <p:nvGrpSpPr>
-          <p:cNvPr id="57" name="Group 56">
+          <p:cNvPr id="10" name="Group 9">
             <a:extLst>
               <a:ext uri="{FF2B5EF4-FFF2-40B4-BE49-F238E27FC236}">
-                <a16:creationId xmlns:a16="http://schemas.microsoft.com/office/drawing/2014/main" id="{E40B1799-F5AE-BC49-A7A9-D3DFD23D6960}"/>
+                <a16:creationId xmlns:a16="http://schemas.microsoft.com/office/drawing/2014/main" id="{E592FD0D-64AB-8B89-BCB1-391F44B3C518}"/>
               </a:ext>
             </a:extLst>
           </p:cNvPr>
@@ -29753,9 +29753,9 @@
         <p:grpSpPr>
           <a:xfrm>
             <a:off x="743774" y="1351284"/>
-            <a:ext cx="6220854" cy="4627976"/>
+            <a:ext cx="6475493" cy="4627976"/>
             <a:chOff x="743774" y="1351284"/>
-            <a:chExt cx="6220854" cy="4627976"/>
+            <a:chExt cx="6475493" cy="4627976"/>
           </a:xfrm>
         </p:grpSpPr>
         <p:sp>
@@ -30443,10 +30443,10 @@
           </p:nvGrpSpPr>
           <p:grpSpPr>
             <a:xfrm>
-              <a:off x="4770318" y="3363235"/>
-              <a:ext cx="2194310" cy="1643472"/>
-              <a:chOff x="4755072" y="2656470"/>
-              <a:chExt cx="2194310" cy="1643472"/>
+              <a:off x="4749314" y="3363235"/>
+              <a:ext cx="2469953" cy="1643472"/>
+              <a:chOff x="4479429" y="2656470"/>
+              <a:chExt cx="2469953" cy="1643472"/>
             </a:xfrm>
           </p:grpSpPr>
           <p:sp>
@@ -30463,8 +30463,8 @@
             </p:nvSpPr>
             <p:spPr>
               <a:xfrm>
-                <a:off x="4755072" y="2656470"/>
-                <a:ext cx="2194310" cy="1643472"/>
+                <a:off x="4479429" y="2656470"/>
+                <a:ext cx="2469953" cy="1643472"/>
               </a:xfrm>
               <a:prstGeom prst="rect">
                 <a:avLst/>
@@ -30526,10 +30526,10 @@
             </p:nvGrpSpPr>
             <p:grpSpPr>
               <a:xfrm>
-                <a:off x="4848683" y="2721868"/>
-                <a:ext cx="2007603" cy="1476817"/>
-                <a:chOff x="6100824" y="2499741"/>
-                <a:chExt cx="2007603" cy="1476818"/>
+                <a:off x="4549956" y="2721869"/>
+                <a:ext cx="2306330" cy="1476816"/>
+                <a:chOff x="5802097" y="2499742"/>
+                <a:chExt cx="2306330" cy="1476817"/>
               </a:xfrm>
             </p:grpSpPr>
             <p:cxnSp>
@@ -30549,8 +30549,8 @@
               </p:nvCxnSpPr>
               <p:spPr>
                 <a:xfrm>
-                  <a:off x="6380528" y="2761620"/>
-                  <a:ext cx="1603" cy="295582"/>
+                  <a:off x="6231165" y="2766655"/>
+                  <a:ext cx="150966" cy="290547"/>
                 </a:xfrm>
                 <a:prstGeom prst="straightConnector1">
                   <a:avLst/>
@@ -30797,8 +30797,8 @@
               </p:nvSpPr>
               <p:spPr>
                 <a:xfrm>
-                  <a:off x="6100824" y="2499741"/>
-                  <a:ext cx="559408" cy="261879"/>
+                  <a:off x="5802097" y="2500108"/>
+                  <a:ext cx="858135" cy="266547"/>
                 </a:xfrm>
                 <a:prstGeom prst="foldedCorner">
                   <a:avLst/>
@@ -30837,7 +30837,7 @@
                       <a:ea typeface="Roboto" panose="02000000000000000000" pitchFamily="2" charset="0"/>
                       <a:cs typeface="Arial" panose="020B0604020202020204" pitchFamily="34" charset="0"/>
                     </a:rPr>
-                    <a:t>glue</a:t>
+                    <a:t>libmicrokit</a:t>
                   </a:r>
                   <a:r>
                     <a:rPr lang="en-US" sz="1000" dirty="0" err="1">
@@ -31238,10 +31238,10 @@
           </p:nvGrpSpPr>
           <p:grpSpPr>
             <a:xfrm flipH="1">
-              <a:off x="4669606" y="2567324"/>
-              <a:ext cx="576590" cy="926473"/>
-              <a:chOff x="4268220" y="2234815"/>
-              <a:chExt cx="768787" cy="1235297"/>
+              <a:off x="4854404" y="2519152"/>
+              <a:ext cx="576988" cy="925645"/>
+              <a:chOff x="4268220" y="2170586"/>
+              <a:chExt cx="769318" cy="1234193"/>
             </a:xfrm>
           </p:grpSpPr>
           <p:sp>
@@ -31257,9 +31257,9 @@
               <p:nvPr/>
             </p:nvSpPr>
             <p:spPr>
-              <a:xfrm rot="17980048">
-                <a:off x="4176509" y="2609614"/>
-                <a:ext cx="1235297" cy="485699"/>
+              <a:xfrm rot="18497637">
+                <a:off x="4177592" y="2544833"/>
+                <a:ext cx="1234193" cy="485699"/>
               </a:xfrm>
               <a:prstGeom prst="leftArrow">
                 <a:avLst/>

</xml_diff>